<commit_message>
Removed notes from slides
</commit_message>
<xml_diff>
--- a/Silvercar Capstone.pptx
+++ b/Silvercar Capstone.pptx
@@ -234,6 +234,11 @@
       </a:defRPr>
     </a:lvl9pPr>
   </p:defaultTextStyle>
+  <p:extLst>
+    <p:ext uri="{EFAFB233-063F-42B5-8137-9DF3F51BA10A}">
+      <p15:sldGuideLst xmlns:p15="http://schemas.microsoft.com/office/powerpoint/2012/main"/>
+    </p:ext>
+  </p:extLst>
 </p:presentation>
 </file>
 
@@ -631,11 +636,7 @@
               </a:spcAft>
               <a:buNone/>
             </a:pPr>
-            <a:r>
-              <a:rPr lang="en"/>
-              <a:t>Hi I’m Michael Engeling. I’m a data scientist with an economics and finance background. When it came time to decide on a final project for this course, I went to Silvercar, which is an Austin-based rental car startup I interned for, to see if they had any data I could use. They were kind enough to give me a lot of their data, so I decided to create a model that would predict when their reservations would be cancelled</a:t>
-            </a:r>
-            <a:endParaRPr/>
+            <a:endParaRPr dirty="0"/>
           </a:p>
         </p:txBody>
       </p:sp>
@@ -843,11 +844,7 @@
               </a:spcAft>
               <a:buNone/>
             </a:pPr>
-            <a:r>
-              <a:rPr lang="en"/>
-              <a:t>Now a little background on Silvercar, Silvercar aims to take the pain out of the car rental process</a:t>
-            </a:r>
-            <a:endParaRPr/>
+            <a:endParaRPr dirty="0"/>
           </a:p>
         </p:txBody>
       </p:sp>
@@ -952,79 +949,7 @@
               <a:buSzPts val="1100"/>
               <a:buChar char="-"/>
             </a:pPr>
-            <a:r>
-              <a:rPr lang="en"/>
-              <a:t>I set out to create a model that’s accurate enough to give them a better idea of roughly how many rides would be cancelled at each location to:</a:t>
-            </a:r>
-            <a:endParaRPr/>
-          </a:p>
-          <a:p>
-            <a:pPr marL="914400" lvl="1" indent="-298450" rtl="0">
-              <a:spcBef>
-                <a:spcPts val="0"/>
-              </a:spcBef>
-              <a:spcAft>
-                <a:spcPts val="0"/>
-              </a:spcAft>
-              <a:buSzPts val="1100"/>
-              <a:buChar char="-"/>
-            </a:pPr>
-            <a:r>
-              <a:rPr lang="en"/>
-              <a:t>Better manage their fleet of cars, so there aren’t as many cars sitting by idly</a:t>
-            </a:r>
-            <a:endParaRPr/>
-          </a:p>
-          <a:p>
-            <a:pPr marL="914400" lvl="1" indent="-298450" rtl="0">
-              <a:spcBef>
-                <a:spcPts val="0"/>
-              </a:spcBef>
-              <a:spcAft>
-                <a:spcPts val="0"/>
-              </a:spcAft>
-              <a:buSzPts val="1100"/>
-              <a:buChar char="-"/>
-            </a:pPr>
-            <a:r>
-              <a:rPr lang="en"/>
-              <a:t>Improve revenue forecasting</a:t>
-            </a:r>
-            <a:endParaRPr/>
-          </a:p>
-          <a:p>
-            <a:pPr marL="914400" lvl="1" indent="-298450" rtl="0">
-              <a:spcBef>
-                <a:spcPts val="0"/>
-              </a:spcBef>
-              <a:spcAft>
-                <a:spcPts val="0"/>
-              </a:spcAft>
-              <a:buSzPts val="1100"/>
-              <a:buChar char="-"/>
-            </a:pPr>
-            <a:r>
-              <a:rPr lang="en"/>
-              <a:t>Maybe identify opportunities to prevent cancellations</a:t>
-            </a:r>
-            <a:endParaRPr/>
-          </a:p>
-          <a:p>
-            <a:pPr marL="457200" lvl="0" indent="-298450">
-              <a:spcBef>
-                <a:spcPts val="0"/>
-              </a:spcBef>
-              <a:spcAft>
-                <a:spcPts val="0"/>
-              </a:spcAft>
-              <a:buSzPts val="1100"/>
-              <a:buChar char="-"/>
-            </a:pPr>
-            <a:r>
-              <a:rPr lang="en"/>
-              <a:t>How did I achieve those results? Next slide</a:t>
-            </a:r>
-            <a:endParaRPr/>
+            <a:endParaRPr dirty="0"/>
           </a:p>
         </p:txBody>
       </p:sp>
@@ -1129,11 +1054,7 @@
               <a:buSzPts val="1100"/>
               <a:buChar char="-"/>
             </a:pPr>
-            <a:r>
-              <a:rPr lang="en"/>
-              <a:t>I used most of the standard data science tools, but I used XGBoost’s implementation of gradient boosting because it’s fast and performs well without much tuning</a:t>
-            </a:r>
-            <a:endParaRPr/>
+            <a:endParaRPr dirty="0"/>
           </a:p>
         </p:txBody>
       </p:sp>
@@ -1238,28 +1159,7 @@
               <a:buSzPts val="1100"/>
               <a:buChar char="-"/>
             </a:pPr>
-            <a:r>
-              <a:rPr lang="en"/>
-              <a:t>As for the data at my disposal, I had access to a number of different data sources that had information on the reservations, the users, promotions, and locations</a:t>
-            </a:r>
-            <a:endParaRPr/>
-          </a:p>
-          <a:p>
-            <a:pPr marL="457200" lvl="0" indent="-298450">
-              <a:spcBef>
-                <a:spcPts val="0"/>
-              </a:spcBef>
-              <a:spcAft>
-                <a:spcPts val="0"/>
-              </a:spcAft>
-              <a:buSzPts val="1100"/>
-              <a:buChar char="-"/>
-            </a:pPr>
-            <a:r>
-              <a:rPr lang="en"/>
-              <a:t>Their reservation page is shown on the screen, and the red boxes indicate some of the available features of reservations that were used in the model </a:t>
-            </a:r>
-            <a:endParaRPr/>
+            <a:endParaRPr dirty="0"/>
           </a:p>
         </p:txBody>
       </p:sp>
@@ -1364,96 +1264,7 @@
               <a:buSzPts val="1100"/>
               <a:buChar char="-"/>
             </a:pPr>
-            <a:r>
-              <a:rPr lang="en"/>
-              <a:t>Started with 75% accurate model and then I did a lot of data analysis and created new features from existing ones</a:t>
-            </a:r>
-            <a:endParaRPr/>
-          </a:p>
-          <a:p>
-            <a:pPr marL="457200" lvl="0" indent="-298450" rtl="0">
-              <a:spcBef>
-                <a:spcPts val="0"/>
-              </a:spcBef>
-              <a:spcAft>
-                <a:spcPts val="0"/>
-              </a:spcAft>
-              <a:buSzPts val="1100"/>
-              <a:buChar char="-"/>
-            </a:pPr>
-            <a:r>
-              <a:rPr lang="en"/>
-              <a:t>This gave me a 95% accurate model, which seemed a little too good because human behavior is inherently unpredictable</a:t>
-            </a:r>
-            <a:endParaRPr/>
-          </a:p>
-          <a:p>
-            <a:pPr marL="457200" lvl="0" indent="-298450" rtl="0">
-              <a:spcBef>
-                <a:spcPts val="0"/>
-              </a:spcBef>
-              <a:spcAft>
-                <a:spcPts val="0"/>
-              </a:spcAft>
-              <a:buSzPts val="1100"/>
-              <a:buChar char="-"/>
-            </a:pPr>
-            <a:r>
-              <a:rPr lang="en"/>
-              <a:t>I couldn’t really use any of my user data because I was testing my model on past data that wouldn’t have been available when making predictions</a:t>
-            </a:r>
-            <a:endParaRPr/>
-          </a:p>
-          <a:p>
-            <a:pPr marL="457200" lvl="0" indent="-298450" rtl="0">
-              <a:spcBef>
-                <a:spcPts val="0"/>
-              </a:spcBef>
-              <a:spcAft>
-                <a:spcPts val="0"/>
-              </a:spcAft>
-              <a:buSzPts val="1100"/>
-              <a:buChar char="-"/>
-            </a:pPr>
-            <a:r>
-              <a:rPr lang="en"/>
-              <a:t>On the screen are two histogram plots of features I had to remove</a:t>
-            </a:r>
-            <a:endParaRPr/>
-          </a:p>
-          <a:p>
-            <a:pPr marL="457200" lvl="0" indent="-298450" rtl="0">
-              <a:spcBef>
-                <a:spcPts val="0"/>
-              </a:spcBef>
-              <a:spcAft>
-                <a:spcPts val="0"/>
-              </a:spcAft>
-              <a:buSzPts val="1100"/>
-              <a:buChar char="-"/>
-            </a:pPr>
-            <a:r>
-              <a:rPr lang="en"/>
-              <a:t>The first shows the distribution of the number of sign-ins and the second shows the distribution of the number of days since the users signed in</a:t>
-            </a:r>
-            <a:endParaRPr/>
-          </a:p>
-          <a:p>
-            <a:pPr marL="457200" lvl="0" indent="-298450" rtl="0">
-              <a:spcBef>
-                <a:spcPts val="0"/>
-              </a:spcBef>
-              <a:spcAft>
-                <a:spcPts val="0"/>
-              </a:spcAft>
-              <a:buSzPts val="1100"/>
-              <a:buChar char="-"/>
-            </a:pPr>
-            <a:r>
-              <a:rPr lang="en"/>
-              <a:t>On average, finished rides have 140 more sign-ins and 115 less days since the user signed in</a:t>
-            </a:r>
-            <a:endParaRPr/>
+            <a:endParaRPr dirty="0"/>
           </a:p>
         </p:txBody>
       </p:sp>
@@ -1558,10 +1369,33 @@
               <a:buNone/>
             </a:pPr>
             <a:r>
-              <a:rPr lang="en"/>
-              <a:t>Cancelled, Finished</a:t>
+              <a:rPr lang="en-US" dirty="0"/>
+              <a:t>Gradient boosting classifiers have misleading feature </a:t>
             </a:r>
-            <a:endParaRPr/>
+            <a:r>
+              <a:rPr lang="en-US" dirty="0" err="1"/>
+              <a:t>importances</a:t>
+            </a:r>
+            <a:r>
+              <a:rPr lang="en-US" dirty="0"/>
+              <a:t> when categorical and numerical features are mixed. In this case, the numerical features are weighted more heavily</a:t>
+            </a:r>
+            <a:br>
+              <a:rPr lang="en-US" dirty="0"/>
+            </a:br>
+            <a:r>
+              <a:rPr lang="en-US" dirty="0"/>
+              <a:t>even though all of the features were standardized. Feature </a:t>
+            </a:r>
+            <a:r>
+              <a:rPr lang="en-US" dirty="0" err="1"/>
+              <a:t>importances</a:t>
+            </a:r>
+            <a:r>
+              <a:rPr lang="en-US" dirty="0"/>
+              <a:t> have to be evaluated separately for the numerical and categorical features.</a:t>
+            </a:r>
+            <a:endParaRPr dirty="0"/>
           </a:p>
           <a:p>
             <a:pPr marL="0" lvl="0" indent="0">
@@ -1573,355 +1407,7 @@
               </a:spcAft>
               <a:buNone/>
             </a:pPr>
-            <a:r>
-              <a:rPr lang="en"/>
-              <a:t>Days to pickup: 22, 15.5</a:t>
-            </a:r>
-            <a:endParaRPr/>
-          </a:p>
-          <a:p>
-            <a:pPr marL="0" lvl="0" indent="0">
-              <a:spcBef>
-                <a:spcPts val="0"/>
-              </a:spcBef>
-              <a:spcAft>
-                <a:spcPts val="0"/>
-              </a:spcAft>
-              <a:buNone/>
-            </a:pPr>
-            <a:r>
-              <a:rPr lang="en"/>
-              <a:t>Trip duration: 2.98, 2.77</a:t>
-            </a:r>
-            <a:endParaRPr/>
-          </a:p>
-          <a:p>
-            <a:pPr marL="0" lvl="0" indent="0">
-              <a:spcBef>
-                <a:spcPts val="0"/>
-              </a:spcBef>
-              <a:spcAft>
-                <a:spcPts val="0"/>
-              </a:spcAft>
-              <a:buNone/>
-            </a:pPr>
-            <a:r>
-              <a:rPr lang="en"/>
-              <a:t>Past rides: 4.5, 2.8</a:t>
-            </a:r>
-            <a:endParaRPr/>
-          </a:p>
-          <a:p>
-            <a:pPr marL="0" lvl="0" indent="0">
-              <a:spcBef>
-                <a:spcPts val="0"/>
-              </a:spcBef>
-              <a:spcAft>
-                <a:spcPts val="0"/>
-              </a:spcAft>
-              <a:buNone/>
-            </a:pPr>
-            <a:r>
-              <a:rPr lang="en"/>
-              <a:t>Percent of past rides cancelled: .45, .34</a:t>
-            </a:r>
-            <a:endParaRPr/>
-          </a:p>
-          <a:p>
-            <a:pPr marL="0" lvl="0" indent="0">
-              <a:spcBef>
-                <a:spcPts val="0"/>
-              </a:spcBef>
-              <a:spcAft>
-                <a:spcPts val="0"/>
-              </a:spcAft>
-              <a:buNone/>
-            </a:pPr>
-            <a:r>
-              <a:rPr lang="en"/>
-              <a:t>Past cancellations: 1.43, 1.03</a:t>
-            </a:r>
-            <a:endParaRPr/>
-          </a:p>
-          <a:p>
-            <a:pPr marL="0" lvl="0" indent="0">
-              <a:spcBef>
-                <a:spcPts val="0"/>
-              </a:spcBef>
-              <a:spcAft>
-                <a:spcPts val="0"/>
-              </a:spcAft>
-              <a:buNone/>
-            </a:pPr>
-            <a:r>
-              <a:rPr lang="en"/>
-              <a:t>Used promo: 0.26, 0.53</a:t>
-            </a:r>
-            <a:endParaRPr/>
-          </a:p>
-          <a:p>
-            <a:pPr marL="0" lvl="0" indent="0">
-              <a:spcBef>
-                <a:spcPts val="0"/>
-              </a:spcBef>
-              <a:spcAft>
-                <a:spcPts val="0"/>
-              </a:spcAft>
-              <a:buNone/>
-            </a:pPr>
-            <a:r>
-              <a:rPr lang="en"/>
-              <a:t>Pickup day of week: 3.04, 2.70</a:t>
-            </a:r>
-            <a:endParaRPr/>
-          </a:p>
-          <a:p>
-            <a:pPr marL="0" lvl="0" indent="0">
-              <a:spcBef>
-                <a:spcPts val="0"/>
-              </a:spcBef>
-              <a:spcAft>
-                <a:spcPts val="0"/>
-              </a:spcAft>
-              <a:buNone/>
-            </a:pPr>
-            <a:r>
-              <a:rPr lang="en"/>
-              <a:t>Web booking: .59, .44</a:t>
-            </a:r>
-            <a:endParaRPr/>
-          </a:p>
-          <a:p>
-            <a:pPr marL="0" lvl="0" indent="0">
-              <a:spcBef>
-                <a:spcPts val="0"/>
-              </a:spcBef>
-              <a:spcAft>
-                <a:spcPts val="0"/>
-              </a:spcAft>
-              <a:buNone/>
-            </a:pPr>
-            <a:r>
-              <a:rPr lang="en"/>
-              <a:t>Insurance personal: .37, .58</a:t>
-            </a:r>
-            <a:endParaRPr/>
-          </a:p>
-          <a:p>
-            <a:pPr marL="0" lvl="0" indent="0">
-              <a:spcBef>
-                <a:spcPts val="0"/>
-              </a:spcBef>
-              <a:spcAft>
-                <a:spcPts val="0"/>
-              </a:spcAft>
-              <a:buNone/>
-            </a:pPr>
-            <a:r>
-              <a:rPr lang="en"/>
-              <a:t>Guest: .31, .15</a:t>
-            </a:r>
-            <a:endParaRPr/>
-          </a:p>
-          <a:p>
-            <a:pPr marL="0" lvl="0" indent="0">
-              <a:spcBef>
-                <a:spcPts val="0"/>
-              </a:spcBef>
-              <a:spcAft>
-                <a:spcPts val="0"/>
-              </a:spcAft>
-              <a:buNone/>
-            </a:pPr>
-            <a:r>
-              <a:rPr lang="en"/>
-              <a:t>Modified profile: .75, .99</a:t>
-            </a:r>
-            <a:endParaRPr/>
-          </a:p>
-          <a:p>
-            <a:pPr marL="0" lvl="0" indent="0">
-              <a:spcBef>
-                <a:spcPts val="0"/>
-              </a:spcBef>
-              <a:spcAft>
-                <a:spcPts val="0"/>
-              </a:spcAft>
-              <a:buNone/>
-            </a:pPr>
-            <a:r>
-              <a:rPr lang="en"/>
-              <a:t>Western pickup: .180, .168</a:t>
-            </a:r>
-            <a:endParaRPr/>
-          </a:p>
-          <a:p>
-            <a:pPr marL="0" lvl="0" indent="0">
-              <a:spcBef>
-                <a:spcPts val="0"/>
-              </a:spcBef>
-              <a:spcAft>
-                <a:spcPts val="0"/>
-              </a:spcAft>
-              <a:buNone/>
-            </a:pPr>
-            <a:r>
-              <a:rPr lang="en"/>
-              <a:t>Insurance silvercar: .14, .10</a:t>
-            </a:r>
-            <a:endParaRPr/>
-          </a:p>
-          <a:p>
-            <a:pPr marL="0" lvl="0" indent="0">
-              <a:spcBef>
-                <a:spcPts val="0"/>
-              </a:spcBef>
-              <a:spcAft>
-                <a:spcPts val="0"/>
-              </a:spcAft>
-              <a:buNone/>
-            </a:pPr>
-            <a:r>
-              <a:rPr lang="en"/>
-              <a:t>Credit card: .61, .99</a:t>
-            </a:r>
-            <a:endParaRPr/>
-          </a:p>
-          <a:p>
-            <a:pPr marL="0" lvl="0" indent="0">
-              <a:spcBef>
-                <a:spcPts val="0"/>
-              </a:spcBef>
-              <a:spcAft>
-                <a:spcPts val="0"/>
-              </a:spcAft>
-              <a:buNone/>
-            </a:pPr>
-            <a:r>
-              <a:rPr lang="en"/>
-              <a:t>Winter pickup: .17, .14</a:t>
-            </a:r>
-            <a:endParaRPr/>
-          </a:p>
-          <a:p>
-            <a:pPr marL="0" lvl="0" indent="0">
-              <a:spcBef>
-                <a:spcPts val="0"/>
-              </a:spcBef>
-              <a:spcAft>
-                <a:spcPts val="0"/>
-              </a:spcAft>
-              <a:buNone/>
-            </a:pPr>
-            <a:r>
-              <a:rPr lang="en"/>
-              <a:t>Weekend pickup: 0.45, 0.36</a:t>
-            </a:r>
-            <a:endParaRPr/>
-          </a:p>
-          <a:p>
-            <a:pPr marL="0" lvl="0" indent="0">
-              <a:spcBef>
-                <a:spcPts val="0"/>
-              </a:spcBef>
-              <a:spcAft>
-                <a:spcPts val="0"/>
-              </a:spcAft>
-              <a:buNone/>
-            </a:pPr>
-            <a:r>
-              <a:rPr lang="en"/>
-              <a:t>Referral: 0.0, 0.05</a:t>
-            </a:r>
-            <a:endParaRPr/>
-          </a:p>
-          <a:p>
-            <a:pPr marL="0" lvl="0" indent="0">
-              <a:spcBef>
-                <a:spcPts val="0"/>
-              </a:spcBef>
-              <a:spcAft>
-                <a:spcPts val="0"/>
-              </a:spcAft>
-              <a:buNone/>
-            </a:pPr>
-            <a:r>
-              <a:rPr lang="en"/>
-              <a:t>Midday pickup: 0.06, 0.03</a:t>
-            </a:r>
-            <a:endParaRPr/>
-          </a:p>
-          <a:p>
-            <a:pPr marL="0" lvl="0" indent="0">
-              <a:spcBef>
-                <a:spcPts val="0"/>
-              </a:spcBef>
-              <a:spcAft>
-                <a:spcPts val="0"/>
-              </a:spcAft>
-              <a:buNone/>
-            </a:pPr>
-            <a:r>
-              <a:rPr lang="en"/>
-              <a:t>Insurance corporate: 0.04, 0.08</a:t>
-            </a:r>
-            <a:endParaRPr/>
-          </a:p>
-          <a:p>
-            <a:pPr marL="0" lvl="0" indent="0">
-              <a:spcBef>
-                <a:spcPts val="0"/>
-              </a:spcBef>
-              <a:spcAft>
-                <a:spcPts val="0"/>
-              </a:spcAft>
-              <a:buNone/>
-            </a:pPr>
-            <a:r>
-              <a:rPr lang="en"/>
-              <a:t>Local rental: 0.005, 0.043</a:t>
-            </a:r>
-            <a:endParaRPr/>
-          </a:p>
-          <a:p>
-            <a:pPr marL="0" lvl="0" indent="0">
-              <a:spcBef>
-                <a:spcPts val="0"/>
-              </a:spcBef>
-              <a:spcAft>
-                <a:spcPts val="0"/>
-              </a:spcAft>
-              <a:buNone/>
-            </a:pPr>
-            <a:r>
-              <a:rPr lang="en"/>
-              <a:t>GDS user: 0.056, 0</a:t>
-            </a:r>
-            <a:endParaRPr/>
-          </a:p>
-          <a:p>
-            <a:pPr marL="0" lvl="0" indent="0">
-              <a:spcBef>
-                <a:spcPts val="0"/>
-              </a:spcBef>
-              <a:spcAft>
-                <a:spcPts val="0"/>
-              </a:spcAft>
-              <a:buNone/>
-            </a:pPr>
-            <a:endParaRPr/>
-          </a:p>
-          <a:p>
-            <a:pPr marL="0" lvl="0" indent="0">
-              <a:spcBef>
-                <a:spcPts val="0"/>
-              </a:spcBef>
-              <a:spcAft>
-                <a:spcPts val="0"/>
-              </a:spcAft>
-              <a:buNone/>
-            </a:pPr>
-            <a:endParaRPr/>
+            <a:endParaRPr dirty="0"/>
           </a:p>
         </p:txBody>
       </p:sp>
@@ -2026,11 +1512,7 @@
               <a:buSzPts val="1100"/>
               <a:buChar char="-"/>
             </a:pPr>
-            <a:r>
-              <a:rPr lang="en"/>
-              <a:t>Currently only using one user variable, GDS (global distribution system) user</a:t>
-            </a:r>
-            <a:endParaRPr/>
+            <a:endParaRPr dirty="0"/>
           </a:p>
         </p:txBody>
       </p:sp>

</xml_diff>

<commit_message>
Added comment about feature importance to slides
</commit_message>
<xml_diff>
--- a/Silvercar Capstone.pptx
+++ b/Silvercar Capstone.pptx
@@ -1370,7 +1370,7 @@
             </a:pPr>
             <a:r>
               <a:rPr lang="en-US" dirty="0"/>
-              <a:t>Gradient boosting classifiers have misleading feature </a:t>
+              <a:t>- Gradient boosting classifiers have misleading feature </a:t>
             </a:r>
             <a:r>
               <a:rPr lang="en-US" dirty="0" err="1"/>
@@ -1394,6 +1394,21 @@
             <a:r>
               <a:rPr lang="en-US" dirty="0"/>
               <a:t> have to be evaluated separately for the numerical and categorical features.</a:t>
+            </a:r>
+          </a:p>
+          <a:p>
+            <a:pPr marL="0" lvl="0" indent="0">
+              <a:spcBef>
+                <a:spcPts val="0"/>
+              </a:spcBef>
+              <a:spcAft>
+                <a:spcPts val="0"/>
+              </a:spcAft>
+              <a:buNone/>
+            </a:pPr>
+            <a:r>
+              <a:rPr lang="en-US" dirty="0"/>
+              <a:t>- The features that are highly correlated can also be used interchangeable, so need to be cautious when ascribing importance to features whose relative importance could be switched </a:t>
             </a:r>
             <a:endParaRPr dirty="0"/>
           </a:p>

</xml_diff>